<commit_message>
Version bumps, added capstone assignment and required stub mappings, updated slides
</commit_message>
<xml_diff>
--- a/RestAssuredWorkshop.pptx
+++ b/RestAssuredWorkshop.pptx
@@ -8,7 +8,7 @@
     <p:sldMasterId id="2147483684" r:id="rId4"/>
   </p:sldMasterIdLst>
   <p:notesMasterIdLst>
-    <p:notesMasterId r:id="rId54"/>
+    <p:notesMasterId r:id="rId56"/>
   </p:notesMasterIdLst>
   <p:sldIdLst>
     <p:sldId id="256" r:id="rId5"/>
@@ -58,8 +58,10 @@
     <p:sldId id="311" r:id="rId49"/>
     <p:sldId id="312" r:id="rId50"/>
     <p:sldId id="313" r:id="rId51"/>
-    <p:sldId id="289" r:id="rId52"/>
-    <p:sldId id="290" r:id="rId53"/>
+    <p:sldId id="609" r:id="rId52"/>
+    <p:sldId id="289" r:id="rId53"/>
+    <p:sldId id="608" r:id="rId54"/>
+    <p:sldId id="290" r:id="rId55"/>
   </p:sldIdLst>
   <p:sldSz cx="12192000" cy="6858000"/>
   <p:notesSz cx="6858000" cy="9144000"/>
@@ -312,7 +314,7 @@
             <a:fld id="{38C7E067-87B0-48A7-AF7C-EA8B321B878F}" type="datetime1">
               <a:rPr lang="nl-NL"/>
               <a:pPr lvl="0"/>
-              <a:t>27-3-2019</a:t>
+              <a:t>3-3-2020</a:t>
             </a:fld>
             <a:endParaRPr lang="nl-NL"/>
           </a:p>
@@ -734,7 +736,12 @@
             <p:ph type="sldImg"/>
           </p:nvPr>
         </p:nvSpPr>
-        <p:spPr/>
+        <p:spPr>
+          <a:xfrm>
+            <a:off x="685800" y="1143000"/>
+            <a:ext cx="5486400" cy="3086100"/>
+          </a:xfrm>
+        </p:spPr>
       </p:sp>
       <p:sp>
         <p:nvSpPr>
@@ -2317,7 +2324,12 @@
             <p:ph type="sldImg"/>
           </p:nvPr>
         </p:nvSpPr>
-        <p:spPr/>
+        <p:spPr>
+          <a:xfrm>
+            <a:off x="685800" y="1143000"/>
+            <a:ext cx="5486400" cy="3086100"/>
+          </a:xfrm>
+        </p:spPr>
       </p:sp>
       <p:sp>
         <p:nvSpPr>
@@ -4565,7 +4577,12 @@
             <p:ph type="sldImg"/>
           </p:nvPr>
         </p:nvSpPr>
-        <p:spPr/>
+        <p:spPr>
+          <a:xfrm>
+            <a:off x="685800" y="1143000"/>
+            <a:ext cx="5486400" cy="3086100"/>
+          </a:xfrm>
+        </p:spPr>
       </p:sp>
       <p:sp>
         <p:nvSpPr>
@@ -4647,7 +4664,7 @@
               </a:defRPr>
             </a:pPr>
             <a:fld id="{5797C95C-FBDB-4AA5-977F-19F9A2193BE5}" type="slidenum">
-              <a:t>48</a:t>
+              <a:t>49</a:t>
             </a:fld>
             <a:endParaRPr lang="nl-NL" sz="1200" b="0" i="0" u="none" strike="noStrike" kern="1200" cap="none" spc="0" baseline="0">
               <a:solidFill>
@@ -4689,7 +4706,7 @@
           <p:cNvPr id="2" name="Slide Image Placeholder 1">
             <a:extLst>
               <a:ext uri="{FF2B5EF4-FFF2-40B4-BE49-F238E27FC236}">
-                <a16:creationId xmlns:a16="http://schemas.microsoft.com/office/drawing/2014/main" id="{1AA585B4-8CD5-471A-BFAE-C9EA5041C17F}"/>
+                <a16:creationId xmlns:a16="http://schemas.microsoft.com/office/drawing/2014/main" id="{76DF07AD-101D-46D2-8A14-13DB25B69B94}"/>
               </a:ext>
             </a:extLst>
           </p:cNvPr>
@@ -4700,14 +4717,19 @@
             <p:ph type="sldImg"/>
           </p:nvPr>
         </p:nvSpPr>
-        <p:spPr/>
+        <p:spPr>
+          <a:xfrm>
+            <a:off x="685800" y="1143000"/>
+            <a:ext cx="5486400" cy="3086100"/>
+          </a:xfrm>
+        </p:spPr>
       </p:sp>
       <p:sp>
         <p:nvSpPr>
           <p:cNvPr id="3" name="Notes Placeholder 2">
             <a:extLst>
               <a:ext uri="{FF2B5EF4-FFF2-40B4-BE49-F238E27FC236}">
-                <a16:creationId xmlns:a16="http://schemas.microsoft.com/office/drawing/2014/main" id="{B8C42949-2813-4570-A42A-5D07D6518823}"/>
+                <a16:creationId xmlns:a16="http://schemas.microsoft.com/office/drawing/2014/main" id="{029D86D9-D271-4E70-BD26-B4E0BD90C19B}"/>
               </a:ext>
             </a:extLst>
           </p:cNvPr>
@@ -4726,7 +4748,7 @@
             <a:pPr lvl="0"/>
             <a:r>
               <a:rPr lang="nl-NL"/>
-              <a:t>Here’s the part where you can shamelessly promote yourself (or give the participants your contact details in case they want more information or have any other questions, of course…). Feel free to replace this with your own contact details, you’re the one delivering the workshop after all!</a:t>
+              <a:t>Any questions?</a:t>
             </a:r>
           </a:p>
         </p:txBody>
@@ -4736,7 +4758,7 @@
           <p:cNvPr id="4" name="Slide Number Placeholder 3">
             <a:extLst>
               <a:ext uri="{FF2B5EF4-FFF2-40B4-BE49-F238E27FC236}">
-                <a16:creationId xmlns:a16="http://schemas.microsoft.com/office/drawing/2014/main" id="{58DB3C57-1ABD-4830-91E1-DA27212C0A7A}"/>
+                <a16:creationId xmlns:a16="http://schemas.microsoft.com/office/drawing/2014/main" id="{9CC864D2-459F-40A2-B5AF-0AFFBCF062D9}"/>
               </a:ext>
             </a:extLst>
           </p:cNvPr>
@@ -4781,8 +4803,153 @@
                 <a:uFillTx/>
               </a:defRPr>
             </a:pPr>
+            <a:fld id="{5797C95C-FBDB-4AA5-977F-19F9A2193BE5}" type="slidenum">
+              <a:t>50</a:t>
+            </a:fld>
+            <a:endParaRPr lang="nl-NL" sz="1200" b="0" i="0" u="none" strike="noStrike" kern="1200" cap="none" spc="0" baseline="0">
+              <a:solidFill>
+                <a:srgbClr val="000000"/>
+              </a:solidFill>
+              <a:uFillTx/>
+              <a:latin typeface="Calibri"/>
+            </a:endParaRPr>
+          </a:p>
+        </p:txBody>
+      </p:sp>
+    </p:spTree>
+    <p:extLst>
+      <p:ext uri="{BB962C8B-B14F-4D97-AF65-F5344CB8AC3E}">
+        <p14:creationId xmlns:p14="http://schemas.microsoft.com/office/powerpoint/2010/main" val="1698956250"/>
+      </p:ext>
+    </p:extLst>
+  </p:cSld>
+  <p:clrMapOvr>
+    <a:masterClrMapping/>
+  </p:clrMapOvr>
+</p:notes>
+</file>
+
+<file path=ppt/notesSlides/notesSlide36.xml><?xml version="1.0" encoding="utf-8"?>
+<p:notes xmlns:a="http://schemas.openxmlformats.org/drawingml/2006/main" xmlns:r="http://schemas.openxmlformats.org/officeDocument/2006/relationships" xmlns:p="http://schemas.openxmlformats.org/presentationml/2006/main">
+  <p:cSld>
+    <p:spTree>
+      <p:nvGrpSpPr>
+        <p:cNvPr id="1" name=""/>
+        <p:cNvGrpSpPr/>
+        <p:nvPr/>
+      </p:nvGrpSpPr>
+      <p:grpSpPr>
+        <a:xfrm>
+          <a:off x="0" y="0"/>
+          <a:ext cx="0" cy="0"/>
+          <a:chOff x="0" y="0"/>
+          <a:chExt cx="0" cy="0"/>
+        </a:xfrm>
+      </p:grpSpPr>
+      <p:sp>
+        <p:nvSpPr>
+          <p:cNvPr id="2" name="Slide Image Placeholder 1">
+            <a:extLst>
+              <a:ext uri="{FF2B5EF4-FFF2-40B4-BE49-F238E27FC236}">
+                <a16:creationId xmlns:a16="http://schemas.microsoft.com/office/drawing/2014/main" id="{1AA585B4-8CD5-471A-BFAE-C9EA5041C17F}"/>
+              </a:ext>
+            </a:extLst>
+          </p:cNvPr>
+          <p:cNvSpPr>
+            <a:spLocks noGrp="1" noRot="1" noChangeAspect="1"/>
+          </p:cNvSpPr>
+          <p:nvPr>
+            <p:ph type="sldImg"/>
+          </p:nvPr>
+        </p:nvSpPr>
+        <p:spPr>
+          <a:xfrm>
+            <a:off x="685800" y="1143000"/>
+            <a:ext cx="5486400" cy="3086100"/>
+          </a:xfrm>
+        </p:spPr>
+      </p:sp>
+      <p:sp>
+        <p:nvSpPr>
+          <p:cNvPr id="3" name="Notes Placeholder 2">
+            <a:extLst>
+              <a:ext uri="{FF2B5EF4-FFF2-40B4-BE49-F238E27FC236}">
+                <a16:creationId xmlns:a16="http://schemas.microsoft.com/office/drawing/2014/main" id="{B8C42949-2813-4570-A42A-5D07D6518823}"/>
+              </a:ext>
+            </a:extLst>
+          </p:cNvPr>
+          <p:cNvSpPr txBox="1">
+            <a:spLocks noGrp="1"/>
+          </p:cNvSpPr>
+          <p:nvPr>
+            <p:ph type="body" sz="quarter" idx="1"/>
+          </p:nvPr>
+        </p:nvSpPr>
+        <p:spPr/>
+        <p:txBody>
+          <a:bodyPr/>
+          <a:lstStyle/>
+          <a:p>
+            <a:pPr lvl="0"/>
+            <a:r>
+              <a:rPr lang="nl-NL"/>
+              <a:t>Here’s the part where you can shamelessly promote yourself (or give the participants your contact details in case they want more information or have any other questions, of course…). Feel free to replace this with your own contact details, you’re the one delivering the workshop after all!</a:t>
+            </a:r>
+          </a:p>
+        </p:txBody>
+      </p:sp>
+      <p:sp>
+        <p:nvSpPr>
+          <p:cNvPr id="4" name="Slide Number Placeholder 3">
+            <a:extLst>
+              <a:ext uri="{FF2B5EF4-FFF2-40B4-BE49-F238E27FC236}">
+                <a16:creationId xmlns:a16="http://schemas.microsoft.com/office/drawing/2014/main" id="{58DB3C57-1ABD-4830-91E1-DA27212C0A7A}"/>
+              </a:ext>
+            </a:extLst>
+          </p:cNvPr>
+          <p:cNvSpPr txBox="1"/>
+          <p:nvPr/>
+        </p:nvSpPr>
+        <p:spPr>
+          <a:xfrm>
+            <a:off x="3884608" y="8685208"/>
+            <a:ext cx="2971800" cy="458791"/>
+          </a:xfrm>
+          <a:prstGeom prst="rect">
+            <a:avLst/>
+          </a:prstGeom>
+          <a:noFill/>
+          <a:ln cap="flat">
+            <a:noFill/>
+          </a:ln>
+        </p:spPr>
+        <p:txBody>
+          <a:bodyPr vert="horz" wrap="square" lIns="91440" tIns="45720" rIns="91440" bIns="45720" anchor="b" anchorCtr="0" compatLnSpc="1">
+            <a:noAutofit/>
+          </a:bodyPr>
+          <a:lstStyle/>
+          <a:p>
+            <a:pPr marL="0" marR="0" lvl="0" indent="0" algn="r" defTabSz="914400" rtl="0" fontAlgn="auto" hangingPunct="1">
+              <a:lnSpc>
+                <a:spcPct val="100000"/>
+              </a:lnSpc>
+              <a:spcBef>
+                <a:spcPts val="0"/>
+              </a:spcBef>
+              <a:spcAft>
+                <a:spcPts val="0"/>
+              </a:spcAft>
+              <a:buNone/>
+              <a:tabLst/>
+              <a:defRPr sz="1800" b="0" i="0" u="none" strike="noStrike" kern="0" cap="none" spc="0" baseline="0">
+                <a:solidFill>
+                  <a:srgbClr val="000000"/>
+                </a:solidFill>
+                <a:uFillTx/>
+              </a:defRPr>
+            </a:pPr>
             <a:fld id="{291901F8-18AB-4A4F-A64B-34056565670D}" type="slidenum">
-              <a:t>49</a:t>
+              <a:t>51</a:t>
             </a:fld>
             <a:endParaRPr lang="nl-NL" sz="1200" b="0" i="0" u="none" strike="noStrike" kern="1200" cap="none" spc="0" baseline="0">
               <a:solidFill>
@@ -5774,7 +5941,7 @@
             <a:fld id="{9F353120-334F-4ED0-885F-86728C006A2A}" type="datetime1">
               <a:rPr lang="nl-NL"/>
               <a:pPr lvl="0"/>
-              <a:t>27-3-2019</a:t>
+              <a:t>3-3-2020</a:t>
             </a:fld>
             <a:endParaRPr lang="nl-NL"/>
           </a:p>
@@ -6011,7 +6178,7 @@
             <a:fld id="{BBD559C5-BBD5-4E05-8119-BA84ECDCBBC9}" type="datetime1">
               <a:rPr lang="nl-NL"/>
               <a:pPr lvl="0"/>
-              <a:t>27-3-2019</a:t>
+              <a:t>3-3-2020</a:t>
             </a:fld>
             <a:endParaRPr lang="nl-NL"/>
           </a:p>
@@ -6257,7 +6424,7 @@
             <a:fld id="{1A8C06C7-C130-4EDF-A1BC-8A1ADA3A8C49}" type="datetime1">
               <a:rPr lang="nl-NL"/>
               <a:pPr lvl="0"/>
-              <a:t>27-3-2019</a:t>
+              <a:t>3-3-2020</a:t>
             </a:fld>
             <a:endParaRPr lang="nl-NL"/>
           </a:p>
@@ -6464,7 +6631,7 @@
             <a:fld id="{0EEA0F42-FF54-4878-A646-C57FB974670E}" type="datetime1">
               <a:rPr lang="nl-NL"/>
               <a:pPr lvl="0"/>
-              <a:t>27-3-2019</a:t>
+              <a:t>3-3-2020</a:t>
             </a:fld>
             <a:endParaRPr lang="nl-NL"/>
           </a:p>
@@ -6700,7 +6867,7 @@
             <a:fld id="{862BB63C-E254-42D2-9CA7-2DD237DD4C22}" type="datetime1">
               <a:rPr lang="nl-NL"/>
               <a:pPr lvl="0"/>
-              <a:t>27-3-2019</a:t>
+              <a:t>3-3-2020</a:t>
             </a:fld>
             <a:endParaRPr lang="nl-NL"/>
           </a:p>
@@ -6911,7 +7078,7 @@
             <a:fld id="{CA161285-D59A-496F-B4DB-1E80D5E8B075}" type="datetime1">
               <a:rPr lang="nl-NL"/>
               <a:pPr lvl="0"/>
-              <a:t>27-3-2019</a:t>
+              <a:t>3-3-2020</a:t>
             </a:fld>
             <a:endParaRPr lang="nl-NL"/>
           </a:p>
@@ -7231,7 +7398,7 @@
             <a:fld id="{93F400A2-F3F0-4BAB-85D9-B0A4695384F6}" type="datetime1">
               <a:rPr lang="nl-NL"/>
               <a:pPr lvl="0"/>
-              <a:t>27-3-2019</a:t>
+              <a:t>3-3-2020</a:t>
             </a:fld>
             <a:endParaRPr lang="nl-NL"/>
           </a:p>
@@ -7634,7 +7801,7 @@
             <a:fld id="{51074681-7954-455A-BC39-979E308542A1}" type="datetime1">
               <a:rPr lang="nl-NL"/>
               <a:pPr lvl="0"/>
-              <a:t>27-3-2019</a:t>
+              <a:t>3-3-2020</a:t>
             </a:fld>
             <a:endParaRPr lang="nl-NL"/>
           </a:p>
@@ -7796,7 +7963,7 @@
             <a:fld id="{843EDBCF-B50F-4F9D-82FF-FE37B8E3242F}" type="datetime1">
               <a:rPr lang="nl-NL"/>
               <a:pPr lvl="0"/>
-              <a:t>27-3-2019</a:t>
+              <a:t>3-3-2020</a:t>
             </a:fld>
             <a:endParaRPr lang="nl-NL"/>
           </a:p>
@@ -7924,7 +8091,7 @@
             <a:fld id="{E66AEB38-A95A-4131-9C16-2EDD2FD8A7E3}" type="datetime1">
               <a:rPr lang="nl-NL"/>
               <a:pPr lvl="0"/>
-              <a:t>27-3-2019</a:t>
+              <a:t>3-3-2020</a:t>
             </a:fld>
             <a:endParaRPr lang="nl-NL"/>
           </a:p>
@@ -8209,7 +8376,7 @@
             <a:fld id="{DE00E736-EA6F-44D7-B99F-5E4D15F940C3}" type="datetime1">
               <a:rPr lang="nl-NL"/>
               <a:pPr lvl="0"/>
-              <a:t>27-3-2019</a:t>
+              <a:t>3-3-2020</a:t>
             </a:fld>
             <a:endParaRPr lang="nl-NL"/>
           </a:p>
@@ -8445,7 +8612,7 @@
             <a:fld id="{1A143B82-DD4F-4088-A624-3503A61074F0}" type="datetime1">
               <a:rPr lang="nl-NL"/>
               <a:pPr lvl="0"/>
-              <a:t>27-3-2019</a:t>
+              <a:t>3-3-2020</a:t>
             </a:fld>
             <a:endParaRPr lang="nl-NL"/>
           </a:p>
@@ -8688,7 +8855,7 @@
             <a:fld id="{2B71CD38-120C-4370-82EF-6EFC98206A62}" type="datetime1">
               <a:rPr lang="nl-NL"/>
               <a:pPr lvl="0"/>
-              <a:t>27-3-2019</a:t>
+              <a:t>3-3-2020</a:t>
             </a:fld>
             <a:endParaRPr lang="nl-NL"/>
           </a:p>
@@ -8924,7 +9091,7 @@
             <a:fld id="{9E817389-298C-4898-AC8C-24B846E7FDE0}" type="datetime1">
               <a:rPr lang="nl-NL"/>
               <a:pPr lvl="0"/>
-              <a:t>27-3-2019</a:t>
+              <a:t>3-3-2020</a:t>
             </a:fld>
             <a:endParaRPr lang="nl-NL"/>
           </a:p>
@@ -9170,7 +9337,7 @@
             <a:fld id="{A7DD276C-3068-4FCD-8BB9-E63E5743A8E7}" type="datetime1">
               <a:rPr lang="nl-NL"/>
               <a:pPr lvl="0"/>
-              <a:t>27-3-2019</a:t>
+              <a:t>3-3-2020</a:t>
             </a:fld>
             <a:endParaRPr lang="nl-NL"/>
           </a:p>
@@ -9377,7 +9544,7 @@
             <a:fld id="{38B22AC6-E809-412A-B7FD-325ABF3A6E9F}" type="datetime1">
               <a:rPr lang="nl-NL"/>
               <a:pPr lvl="0"/>
-              <a:t>27-3-2019</a:t>
+              <a:t>3-3-2020</a:t>
             </a:fld>
             <a:endParaRPr lang="nl-NL"/>
           </a:p>
@@ -9613,7 +9780,7 @@
             <a:fld id="{7C98114B-2606-441D-9B0C-C8E4F832DA47}" type="datetime1">
               <a:rPr lang="nl-NL"/>
               <a:pPr lvl="0"/>
-              <a:t>27-3-2019</a:t>
+              <a:t>3-3-2020</a:t>
             </a:fld>
             <a:endParaRPr lang="nl-NL"/>
           </a:p>
@@ -9824,7 +9991,7 @@
             <a:fld id="{12946972-30D7-4BCD-B945-1BFED9D30B57}" type="datetime1">
               <a:rPr lang="nl-NL"/>
               <a:pPr lvl="0"/>
-              <a:t>27-3-2019</a:t>
+              <a:t>3-3-2020</a:t>
             </a:fld>
             <a:endParaRPr lang="nl-NL"/>
           </a:p>
@@ -10144,7 +10311,7 @@
             <a:fld id="{54A1A2A4-8D16-4856-9D98-1E00C03C68A5}" type="datetime1">
               <a:rPr lang="nl-NL"/>
               <a:pPr lvl="0"/>
-              <a:t>27-3-2019</a:t>
+              <a:t>3-3-2020</a:t>
             </a:fld>
             <a:endParaRPr lang="nl-NL"/>
           </a:p>
@@ -10547,7 +10714,7 @@
             <a:fld id="{98F7FD0A-3441-4AD1-97F8-A4D453E965C6}" type="datetime1">
               <a:rPr lang="nl-NL"/>
               <a:pPr lvl="0"/>
-              <a:t>27-3-2019</a:t>
+              <a:t>3-3-2020</a:t>
             </a:fld>
             <a:endParaRPr lang="nl-NL"/>
           </a:p>
@@ -10709,7 +10876,7 @@
             <a:fld id="{F4500FEA-CE93-4330-AE25-C1CB1FE0057E}" type="datetime1">
               <a:rPr lang="nl-NL"/>
               <a:pPr lvl="0"/>
-              <a:t>27-3-2019</a:t>
+              <a:t>3-3-2020</a:t>
             </a:fld>
             <a:endParaRPr lang="nl-NL"/>
           </a:p>
@@ -10837,7 +11004,7 @@
             <a:fld id="{D0EAF5EB-F2A7-43A7-9549-45FD408C7D0F}" type="datetime1">
               <a:rPr lang="nl-NL"/>
               <a:pPr lvl="0"/>
-              <a:t>27-3-2019</a:t>
+              <a:t>3-3-2020</a:t>
             </a:fld>
             <a:endParaRPr lang="nl-NL"/>
           </a:p>
@@ -11047,7 +11214,7 @@
             <a:fld id="{94507691-7B59-419E-9A18-3770DDAE5591}" type="datetime1">
               <a:rPr lang="nl-NL"/>
               <a:pPr lvl="0"/>
-              <a:t>27-3-2019</a:t>
+              <a:t>3-3-2020</a:t>
             </a:fld>
             <a:endParaRPr lang="nl-NL"/>
           </a:p>
@@ -11332,7 +11499,7 @@
             <a:fld id="{210F20F8-4CB9-4625-ABC2-8F6437464197}" type="datetime1">
               <a:rPr lang="nl-NL"/>
               <a:pPr lvl="0"/>
-              <a:t>27-3-2019</a:t>
+              <a:t>3-3-2020</a:t>
             </a:fld>
             <a:endParaRPr lang="nl-NL"/>
           </a:p>
@@ -11574,7 +11741,7 @@
             <a:fld id="{F38CEE4A-2408-410F-BF05-68AE90595830}" type="datetime1">
               <a:rPr lang="nl-NL"/>
               <a:pPr lvl="0"/>
-              <a:t>27-3-2019</a:t>
+              <a:t>3-3-2020</a:t>
             </a:fld>
             <a:endParaRPr lang="nl-NL"/>
           </a:p>
@@ -11810,7 +11977,7 @@
             <a:fld id="{D4A366E7-BE4A-419E-8E37-D3D581A948E8}" type="datetime1">
               <a:rPr lang="nl-NL"/>
               <a:pPr lvl="0"/>
-              <a:t>27-3-2019</a:t>
+              <a:t>3-3-2020</a:t>
             </a:fld>
             <a:endParaRPr lang="nl-NL"/>
           </a:p>
@@ -12056,7 +12223,7 @@
             <a:fld id="{97A7867A-847C-4448-ACCC-33AFE1856F0B}" type="datetime1">
               <a:rPr lang="nl-NL"/>
               <a:pPr lvl="0"/>
-              <a:t>27-3-2019</a:t>
+              <a:t>3-3-2020</a:t>
             </a:fld>
             <a:endParaRPr lang="nl-NL"/>
           </a:p>
@@ -12263,7 +12430,7 @@
             <a:fld id="{7C834043-2FDA-4D68-8414-01D8CBA95D6D}" type="datetime1">
               <a:rPr lang="nl-NL"/>
               <a:pPr lvl="0"/>
-              <a:t>27-3-2019</a:t>
+              <a:t>3-3-2020</a:t>
             </a:fld>
             <a:endParaRPr lang="nl-NL"/>
           </a:p>
@@ -12499,7 +12666,7 @@
             <a:fld id="{E11FCED8-4DBE-418A-8D6A-AF59252D44B3}" type="datetime1">
               <a:rPr lang="nl-NL"/>
               <a:pPr lvl="0"/>
-              <a:t>27-3-2019</a:t>
+              <a:t>3-3-2020</a:t>
             </a:fld>
             <a:endParaRPr lang="nl-NL"/>
           </a:p>
@@ -12710,7 +12877,7 @@
             <a:fld id="{9D616604-5EB0-4C28-9DD9-6ADC34229F0C}" type="datetime1">
               <a:rPr lang="nl-NL"/>
               <a:pPr lvl="0"/>
-              <a:t>27-3-2019</a:t>
+              <a:t>3-3-2020</a:t>
             </a:fld>
             <a:endParaRPr lang="nl-NL"/>
           </a:p>
@@ -13030,7 +13197,7 @@
             <a:fld id="{2F71F75A-B000-4A31-9296-751EE3556BD3}" type="datetime1">
               <a:rPr lang="nl-NL"/>
               <a:pPr lvl="0"/>
-              <a:t>27-3-2019</a:t>
+              <a:t>3-3-2020</a:t>
             </a:fld>
             <a:endParaRPr lang="nl-NL"/>
           </a:p>
@@ -13433,7 +13600,7 @@
             <a:fld id="{6E3EF149-2A2F-4C4B-A309-9FEBF52DE125}" type="datetime1">
               <a:rPr lang="nl-NL"/>
               <a:pPr lvl="0"/>
-              <a:t>27-3-2019</a:t>
+              <a:t>3-3-2020</a:t>
             </a:fld>
             <a:endParaRPr lang="nl-NL"/>
           </a:p>
@@ -13595,7 +13762,7 @@
             <a:fld id="{CA9E3964-DC07-4C1A-9B7E-9858C944F8B5}" type="datetime1">
               <a:rPr lang="nl-NL"/>
               <a:pPr lvl="0"/>
-              <a:t>27-3-2019</a:t>
+              <a:t>3-3-2020</a:t>
             </a:fld>
             <a:endParaRPr lang="nl-NL"/>
           </a:p>
@@ -13915,7 +14082,7 @@
             <a:fld id="{3110AB0F-217C-4943-B204-665BD86D8E3B}" type="datetime1">
               <a:rPr lang="nl-NL"/>
               <a:pPr lvl="0"/>
-              <a:t>27-3-2019</a:t>
+              <a:t>3-3-2020</a:t>
             </a:fld>
             <a:endParaRPr lang="nl-NL"/>
           </a:p>
@@ -14043,7 +14210,7 @@
             <a:fld id="{ED31B46A-6804-4A67-AC3A-3F41B9A42696}" type="datetime1">
               <a:rPr lang="nl-NL"/>
               <a:pPr lvl="0"/>
-              <a:t>27-3-2019</a:t>
+              <a:t>3-3-2020</a:t>
             </a:fld>
             <a:endParaRPr lang="nl-NL"/>
           </a:p>
@@ -14328,7 +14495,7 @@
             <a:fld id="{57304D5D-294B-4607-A544-A480D2CA2C4C}" type="datetime1">
               <a:rPr lang="nl-NL"/>
               <a:pPr lvl="0"/>
-              <a:t>27-3-2019</a:t>
+              <a:t>3-3-2020</a:t>
             </a:fld>
             <a:endParaRPr lang="nl-NL"/>
           </a:p>
@@ -14570,7 +14737,7 @@
             <a:fld id="{94324F82-75CC-45B5-835B-7F772990C7D2}" type="datetime1">
               <a:rPr lang="nl-NL"/>
               <a:pPr lvl="0"/>
-              <a:t>27-3-2019</a:t>
+              <a:t>3-3-2020</a:t>
             </a:fld>
             <a:endParaRPr lang="nl-NL"/>
           </a:p>
@@ -14806,7 +14973,7 @@
             <a:fld id="{46AAE1CE-3742-4BF0-9C42-C8BC01CFDF24}" type="datetime1">
               <a:rPr lang="nl-NL"/>
               <a:pPr lvl="0"/>
-              <a:t>27-3-2019</a:t>
+              <a:t>3-3-2020</a:t>
             </a:fld>
             <a:endParaRPr lang="nl-NL"/>
           </a:p>
@@ -15052,7 +15219,7 @@
             <a:fld id="{445E01DF-2E30-40AA-8701-06A22289FED7}" type="datetime1">
               <a:rPr lang="nl-NL"/>
               <a:pPr lvl="0"/>
-              <a:t>27-3-2019</a:t>
+              <a:t>3-3-2020</a:t>
             </a:fld>
             <a:endParaRPr lang="nl-NL"/>
           </a:p>
@@ -15455,7 +15622,7 @@
             <a:fld id="{EF24B46D-6B49-4CBF-8355-DB4287F4ACE1}" type="datetime1">
               <a:rPr lang="nl-NL"/>
               <a:pPr lvl="0"/>
-              <a:t>27-3-2019</a:t>
+              <a:t>3-3-2020</a:t>
             </a:fld>
             <a:endParaRPr lang="nl-NL"/>
           </a:p>
@@ -15617,7 +15784,7 @@
             <a:fld id="{A29A2C93-44AC-4F0D-A967-589D486FAADA}" type="datetime1">
               <a:rPr lang="nl-NL"/>
               <a:pPr lvl="0"/>
-              <a:t>27-3-2019</a:t>
+              <a:t>3-3-2020</a:t>
             </a:fld>
             <a:endParaRPr lang="nl-NL"/>
           </a:p>
@@ -15745,7 +15912,7 @@
             <a:fld id="{BA85F980-1A54-42AF-A7A2-D7E167AF3461}" type="datetime1">
               <a:rPr lang="nl-NL"/>
               <a:pPr lvl="0"/>
-              <a:t>27-3-2019</a:t>
+              <a:t>3-3-2020</a:t>
             </a:fld>
             <a:endParaRPr lang="nl-NL"/>
           </a:p>
@@ -16030,7 +16197,7 @@
             <a:fld id="{7444FC49-4617-4375-90AE-574C49864662}" type="datetime1">
               <a:rPr lang="nl-NL"/>
               <a:pPr lvl="0"/>
-              <a:t>27-3-2019</a:t>
+              <a:t>3-3-2020</a:t>
             </a:fld>
             <a:endParaRPr lang="nl-NL"/>
           </a:p>
@@ -16272,7 +16439,7 @@
             <a:fld id="{3DDCDB17-CBC3-4C37-9C62-F91CC0441161}" type="datetime1">
               <a:rPr lang="nl-NL"/>
               <a:pPr lvl="0"/>
-              <a:t>27-3-2019</a:t>
+              <a:t>3-3-2020</a:t>
             </a:fld>
             <a:endParaRPr lang="nl-NL"/>
           </a:p>
@@ -16555,7 +16722,7 @@
             <a:fld id="{B322D304-BC79-44C5-8C38-9B2EAFD7A858}" type="datetime1">
               <a:rPr lang="nl-NL"/>
               <a:pPr lvl="0"/>
-              <a:t>27-3-2019</a:t>
+              <a:t>3-3-2020</a:t>
             </a:fld>
             <a:endParaRPr lang="nl-NL"/>
           </a:p>
@@ -17209,7 +17376,7 @@
             <a:fld id="{054FFC27-5D2E-44C5-BF50-A60ABA0B841B}" type="datetime1">
               <a:rPr lang="nl-NL"/>
               <a:pPr lvl="0"/>
-              <a:t>27-3-2019</a:t>
+              <a:t>3-3-2020</a:t>
             </a:fld>
             <a:endParaRPr lang="nl-NL"/>
           </a:p>
@@ -17863,7 +18030,7 @@
             <a:fld id="{F7E35A64-8696-430E-BD8D-C66B34156B77}" type="datetime1">
               <a:rPr lang="nl-NL"/>
               <a:pPr lvl="0"/>
-              <a:t>27-3-2019</a:t>
+              <a:t>3-3-2020</a:t>
             </a:fld>
             <a:endParaRPr lang="nl-NL"/>
           </a:p>
@@ -18517,7 +18684,7 @@
             <a:fld id="{17D94DDC-74CB-418A-B090-026A60AF3AB9}" type="datetime1">
               <a:rPr lang="nl-NL"/>
               <a:pPr lvl="0"/>
-              <a:t>27-3-2019</a:t>
+              <a:t>3-3-2020</a:t>
             </a:fld>
             <a:endParaRPr lang="nl-NL"/>
           </a:p>
@@ -19176,7 +19343,7 @@
                 <a:latin typeface="Courier New" pitchFamily="49"/>
                 <a:cs typeface="Courier New" pitchFamily="49"/>
               </a:rPr>
-              <a:t>Originally created by Bas Dijkstra – bas@ontestautomation.com – https://www.ontestautomation.com - @_basdijkstra</a:t>
+              <a:t>Originally created by Bas Dijkstra – bas@ontestautomation.com – https://www.ontestautomation.com</a:t>
             </a:r>
           </a:p>
           <a:p>
@@ -22603,7 +22770,7 @@
                 <a:latin typeface="Courier New" pitchFamily="49"/>
                 <a:cs typeface="Courier New" pitchFamily="49"/>
               </a:rPr>
-              <a:t>Get your hands dirty</a:t>
+              <a:t>Hands-on exercises</a:t>
             </a:r>
           </a:p>
         </p:txBody>
@@ -22671,7 +22838,7 @@
                 <a:latin typeface="Courier New" pitchFamily="49"/>
                 <a:cs typeface="Courier New" pitchFamily="49"/>
               </a:rPr>
-              <a:t>Get your hands dirty!</a:t>
+              <a:t>Now it’s your turn!</a:t>
             </a:r>
           </a:p>
         </p:txBody>
@@ -22692,9 +22859,16 @@
             <p:ph idx="1"/>
           </p:nvPr>
         </p:nvSpPr>
-        <p:spPr/>
-        <p:txBody>
-          <a:bodyPr/>
+        <p:spPr>
+          <a:xfrm>
+            <a:off x="838203" y="1825627"/>
+            <a:ext cx="11287122" cy="4351336"/>
+          </a:xfrm>
+        </p:spPr>
+        <p:txBody>
+          <a:bodyPr>
+            <a:normAutofit/>
+          </a:bodyPr>
           <a:lstStyle/>
           <a:p>
             <a:pPr lvl="0">
@@ -22712,7 +22886,7 @@
                 <a:latin typeface="Courier New" pitchFamily="49"/>
                 <a:cs typeface="Courier New" pitchFamily="49"/>
               </a:rPr>
-              <a:t>RestAssuredExercises1</a:t>
+              <a:t>src &gt; test &gt; java &gt; exercises &gt; RestAssuredExercises1Test.java</a:t>
             </a:r>
           </a:p>
           <a:p>
@@ -24584,7 +24758,7 @@
                 <a:latin typeface="Courier New" pitchFamily="49"/>
                 <a:cs typeface="Courier New" pitchFamily="49"/>
               </a:rPr>
-              <a:t>Get your hands dirty!</a:t>
+              <a:t>Now it’s your turn!</a:t>
             </a:r>
           </a:p>
         </p:txBody>
@@ -24611,6 +24785,9 @@
           <a:lstStyle/>
           <a:p>
             <a:pPr lvl="0">
+              <a:lnSpc>
+                <a:spcPct val="70000"/>
+              </a:lnSpc>
               <a:buFont typeface="Courier New" pitchFamily="49"/>
               <a:buChar char="_"/>
             </a:pPr>
@@ -24622,7 +24799,7 @@
                 <a:latin typeface="Courier New" pitchFamily="49"/>
                 <a:cs typeface="Courier New" pitchFamily="49"/>
               </a:rPr>
-              <a:t>RestAssuredExercises2</a:t>
+              <a:t>src &gt; test &gt; java &gt; exercises &gt; RestAssuredExercises2Test.java</a:t>
             </a:r>
           </a:p>
           <a:p>
@@ -27298,7 +27475,7 @@
                 <a:latin typeface="Courier New" pitchFamily="49"/>
                 <a:cs typeface="Courier New" pitchFamily="49"/>
               </a:rPr>
-              <a:t>Get your hands dirty!</a:t>
+              <a:t>Now it’s your turn!</a:t>
             </a:r>
           </a:p>
         </p:txBody>
@@ -27321,10 +27498,12 @@
         </p:nvSpPr>
         <p:spPr/>
         <p:txBody>
-          <a:bodyPr/>
+          <a:bodyPr>
+            <a:normAutofit lnSpcReduction="10000"/>
+          </a:bodyPr>
           <a:lstStyle/>
           <a:p>
-            <a:pPr lvl="0">
+            <a:pPr>
               <a:buFont typeface="Courier New" pitchFamily="49"/>
               <a:buChar char="_"/>
             </a:pPr>
@@ -27336,7 +27515,7 @@
                 <a:latin typeface="Courier New" pitchFamily="49"/>
                 <a:cs typeface="Courier New" pitchFamily="49"/>
               </a:rPr>
-              <a:t>RestAssuredExercises3</a:t>
+              <a:t>src &gt; test &gt; java &gt; exercises &gt; RestAssuredExercises3Test.java</a:t>
             </a:r>
           </a:p>
           <a:p>
@@ -30357,7 +30536,7 @@
                 <a:latin typeface="Courier New" pitchFamily="49"/>
                 <a:cs typeface="Courier New" pitchFamily="49"/>
               </a:rPr>
-              <a:t>Get your hands dirty!</a:t>
+              <a:t>Now it’s your turn!</a:t>
             </a:r>
           </a:p>
         </p:txBody>
@@ -30380,10 +30559,12 @@
         </p:nvSpPr>
         <p:spPr/>
         <p:txBody>
-          <a:bodyPr/>
+          <a:bodyPr>
+            <a:normAutofit lnSpcReduction="10000"/>
+          </a:bodyPr>
           <a:lstStyle/>
           <a:p>
-            <a:pPr lvl="0">
+            <a:pPr>
               <a:lnSpc>
                 <a:spcPct val="70000"/>
               </a:lnSpc>
@@ -30398,7 +30579,7 @@
                 <a:latin typeface="Courier New" pitchFamily="49"/>
                 <a:cs typeface="Courier New" pitchFamily="49"/>
               </a:rPr>
-              <a:t>RestAssuredExercises4</a:t>
+              <a:t>src &gt; test &gt; java &gt; exercises &gt; RestAssuredExercises4Test.java</a:t>
             </a:r>
           </a:p>
           <a:p>
@@ -31577,7 +31758,7 @@
                 <a:latin typeface="Courier New" pitchFamily="49"/>
                 <a:cs typeface="Courier New" pitchFamily="49"/>
               </a:rPr>
-              <a:t>Get your hands dirty!</a:t>
+              <a:t>Now it’s your turn!</a:t>
             </a:r>
           </a:p>
         </p:txBody>
@@ -31600,10 +31781,12 @@
         </p:nvSpPr>
         <p:spPr/>
         <p:txBody>
-          <a:bodyPr/>
+          <a:bodyPr>
+            <a:normAutofit/>
+          </a:bodyPr>
           <a:lstStyle/>
           <a:p>
-            <a:pPr lvl="0">
+            <a:pPr>
               <a:buFont typeface="Courier New" pitchFamily="49"/>
               <a:buChar char="_"/>
             </a:pPr>
@@ -31615,7 +31798,7 @@
                 <a:latin typeface="Courier New" pitchFamily="49"/>
                 <a:cs typeface="Courier New" pitchFamily="49"/>
               </a:rPr>
-              <a:t>RestAssuredExercises5</a:t>
+              <a:t>src &gt; test &gt; java &gt; exercises &gt; RestAssuredExercises5Test.java</a:t>
             </a:r>
           </a:p>
           <a:p>
@@ -31780,6 +31963,295 @@
 </file>
 
 <file path=ppt/slides/slide48.xml><?xml version="1.0" encoding="utf-8"?>
+<p:sld xmlns:a="http://schemas.openxmlformats.org/drawingml/2006/main" xmlns:r="http://schemas.openxmlformats.org/officeDocument/2006/relationships" xmlns:p="http://schemas.openxmlformats.org/presentationml/2006/main">
+  <p:cSld>
+    <p:bg>
+      <p:bgPr>
+        <a:solidFill>
+          <a:srgbClr val="000000"/>
+        </a:solidFill>
+        <a:effectLst/>
+      </p:bgPr>
+    </p:bg>
+    <p:spTree>
+      <p:nvGrpSpPr>
+        <p:cNvPr id="1" name=""/>
+        <p:cNvGrpSpPr/>
+        <p:nvPr/>
+      </p:nvGrpSpPr>
+      <p:grpSpPr>
+        <a:xfrm>
+          <a:off x="0" y="0"/>
+          <a:ext cx="0" cy="0"/>
+          <a:chOff x="0" y="0"/>
+          <a:chExt cx="0" cy="0"/>
+        </a:xfrm>
+      </p:grpSpPr>
+      <p:sp>
+        <p:nvSpPr>
+          <p:cNvPr id="2" name="Title 1">
+            <a:extLst>
+              <a:ext uri="{FF2B5EF4-FFF2-40B4-BE49-F238E27FC236}">
+                <a16:creationId xmlns:a16="http://schemas.microsoft.com/office/drawing/2014/main" id="{648019D1-0C50-4A71-8276-BB4DAB1EDACA}"/>
+              </a:ext>
+            </a:extLst>
+          </p:cNvPr>
+          <p:cNvSpPr txBox="1">
+            <a:spLocks noGrp="1"/>
+          </p:cNvSpPr>
+          <p:nvPr>
+            <p:ph type="title"/>
+          </p:nvPr>
+        </p:nvSpPr>
+        <p:spPr/>
+        <p:txBody>
+          <a:bodyPr/>
+          <a:lstStyle/>
+          <a:p>
+            <a:pPr lvl="0"/>
+            <a:r>
+              <a:rPr lang="nl-NL">
+                <a:solidFill>
+                  <a:srgbClr val="00FF00"/>
+                </a:solidFill>
+                <a:latin typeface="Courier New" pitchFamily="49"/>
+                <a:cs typeface="Courier New" pitchFamily="49"/>
+              </a:rPr>
+              <a:t>Now it’s your turn!</a:t>
+            </a:r>
+          </a:p>
+        </p:txBody>
+      </p:sp>
+      <p:sp>
+        <p:nvSpPr>
+          <p:cNvPr id="3" name="Content Placeholder 2">
+            <a:extLst>
+              <a:ext uri="{FF2B5EF4-FFF2-40B4-BE49-F238E27FC236}">
+                <a16:creationId xmlns:a16="http://schemas.microsoft.com/office/drawing/2014/main" id="{3A7BF551-85CE-45B6-849A-570E28B4856B}"/>
+              </a:ext>
+            </a:extLst>
+          </p:cNvPr>
+          <p:cNvSpPr txBox="1">
+            <a:spLocks noGrp="1"/>
+          </p:cNvSpPr>
+          <p:nvPr>
+            <p:ph idx="1"/>
+          </p:nvPr>
+        </p:nvSpPr>
+        <p:spPr>
+          <a:xfrm>
+            <a:off x="838203" y="1825626"/>
+            <a:ext cx="10515600" cy="5032373"/>
+          </a:xfrm>
+        </p:spPr>
+        <p:txBody>
+          <a:bodyPr>
+            <a:normAutofit/>
+          </a:bodyPr>
+          <a:lstStyle/>
+          <a:p>
+            <a:pPr>
+              <a:buFont typeface="Courier New" pitchFamily="49"/>
+              <a:buChar char="_"/>
+            </a:pPr>
+            <a:r>
+              <a:rPr lang="nl-NL">
+                <a:solidFill>
+                  <a:srgbClr val="00FF00"/>
+                </a:solidFill>
+                <a:latin typeface="Courier New" pitchFamily="49"/>
+                <a:cs typeface="Courier New" pitchFamily="49"/>
+              </a:rPr>
+              <a:t>src &gt; test &gt; java &gt; exercises &gt; RestAssuredExercises6Test.java</a:t>
+            </a:r>
+          </a:p>
+          <a:p>
+            <a:pPr lvl="0">
+              <a:buFont typeface="Courier New" pitchFamily="49"/>
+              <a:buChar char="_"/>
+            </a:pPr>
+            <a:endParaRPr lang="nl-NL">
+              <a:solidFill>
+                <a:srgbClr val="00FF00"/>
+              </a:solidFill>
+              <a:latin typeface="Courier New" pitchFamily="49"/>
+              <a:cs typeface="Courier New" pitchFamily="49"/>
+            </a:endParaRPr>
+          </a:p>
+          <a:p>
+            <a:pPr lvl="0">
+              <a:buFont typeface="Courier New" pitchFamily="49"/>
+              <a:buChar char="_"/>
+            </a:pPr>
+            <a:r>
+              <a:rPr lang="nl-NL">
+                <a:solidFill>
+                  <a:srgbClr val="00FF00"/>
+                </a:solidFill>
+                <a:latin typeface="Courier New" pitchFamily="49"/>
+                <a:cs typeface="Courier New" pitchFamily="49"/>
+              </a:rPr>
+              <a:t>Capstone assignment</a:t>
+            </a:r>
+          </a:p>
+          <a:p>
+            <a:pPr lvl="0">
+              <a:buFont typeface="Courier New" pitchFamily="49"/>
+              <a:buChar char="_"/>
+            </a:pPr>
+            <a:endParaRPr lang="nl-NL">
+              <a:solidFill>
+                <a:srgbClr val="00FF00"/>
+              </a:solidFill>
+              <a:latin typeface="Courier New" pitchFamily="49"/>
+              <a:cs typeface="Courier New" pitchFamily="49"/>
+            </a:endParaRPr>
+          </a:p>
+          <a:p>
+            <a:pPr lvl="0">
+              <a:buFont typeface="Courier New" pitchFamily="49"/>
+              <a:buChar char="_"/>
+            </a:pPr>
+            <a:r>
+              <a:rPr lang="nl-NL">
+                <a:solidFill>
+                  <a:srgbClr val="00FF00"/>
+                </a:solidFill>
+                <a:latin typeface="Courier New" pitchFamily="49"/>
+                <a:cs typeface="Courier New" pitchFamily="49"/>
+              </a:rPr>
+              <a:t>Combines several concepts we have seen throughout this workshop</a:t>
+            </a:r>
+          </a:p>
+          <a:p>
+            <a:pPr lvl="1">
+              <a:buFont typeface="Courier New" pitchFamily="49"/>
+              <a:buChar char="_"/>
+            </a:pPr>
+            <a:r>
+              <a:rPr lang="nl-NL">
+                <a:solidFill>
+                  <a:srgbClr val="00FF00"/>
+                </a:solidFill>
+                <a:latin typeface="Courier New" pitchFamily="49"/>
+                <a:cs typeface="Courier New" pitchFamily="49"/>
+              </a:rPr>
+              <a:t>Extracting values from responses</a:t>
+            </a:r>
+          </a:p>
+          <a:p>
+            <a:pPr lvl="1">
+              <a:buFont typeface="Courier New" pitchFamily="49"/>
+              <a:buChar char="_"/>
+            </a:pPr>
+            <a:r>
+              <a:rPr lang="nl-NL">
+                <a:solidFill>
+                  <a:srgbClr val="00FF00"/>
+                </a:solidFill>
+                <a:latin typeface="Courier New" pitchFamily="49"/>
+                <a:cs typeface="Courier New" pitchFamily="49"/>
+              </a:rPr>
+              <a:t>Using filters</a:t>
+            </a:r>
+          </a:p>
+          <a:p>
+            <a:pPr lvl="1">
+              <a:buFont typeface="Courier New" pitchFamily="49"/>
+              <a:buChar char="_"/>
+            </a:pPr>
+            <a:r>
+              <a:rPr lang="nl-NL">
+                <a:solidFill>
+                  <a:srgbClr val="00FF00"/>
+                </a:solidFill>
+                <a:latin typeface="Courier New" pitchFamily="49"/>
+                <a:cs typeface="Courier New" pitchFamily="49"/>
+              </a:rPr>
+              <a:t>Parameterization, assertions, …</a:t>
+            </a:r>
+          </a:p>
+          <a:p>
+            <a:pPr lvl="0">
+              <a:buFont typeface="Courier New" pitchFamily="49"/>
+              <a:buChar char="_"/>
+            </a:pPr>
+            <a:endParaRPr lang="nl-NL">
+              <a:solidFill>
+                <a:srgbClr val="00FF00"/>
+              </a:solidFill>
+              <a:latin typeface="Courier New" pitchFamily="49"/>
+              <a:cs typeface="Courier New" pitchFamily="49"/>
+            </a:endParaRPr>
+          </a:p>
+          <a:p>
+            <a:pPr lvl="0">
+              <a:buFont typeface="Courier New" pitchFamily="49"/>
+              <a:buChar char="_"/>
+            </a:pPr>
+            <a:endParaRPr lang="nl-NL">
+              <a:solidFill>
+                <a:srgbClr val="00FF00"/>
+              </a:solidFill>
+              <a:latin typeface="Courier New" pitchFamily="49"/>
+              <a:cs typeface="Courier New" pitchFamily="49"/>
+            </a:endParaRPr>
+          </a:p>
+          <a:p>
+            <a:pPr lvl="0">
+              <a:buFont typeface="Courier New" pitchFamily="49"/>
+              <a:buChar char="_"/>
+            </a:pPr>
+            <a:endParaRPr lang="nl-NL">
+              <a:solidFill>
+                <a:srgbClr val="00FF00"/>
+              </a:solidFill>
+              <a:latin typeface="Courier New" pitchFamily="49"/>
+              <a:cs typeface="Courier New" pitchFamily="49"/>
+            </a:endParaRPr>
+          </a:p>
+          <a:p>
+            <a:pPr lvl="0">
+              <a:buFont typeface="Courier New" pitchFamily="49"/>
+              <a:buChar char="_"/>
+            </a:pPr>
+            <a:endParaRPr lang="nl-NL">
+              <a:solidFill>
+                <a:srgbClr val="00FF00"/>
+              </a:solidFill>
+              <a:latin typeface="Courier New" pitchFamily="49"/>
+              <a:cs typeface="Courier New" pitchFamily="49"/>
+            </a:endParaRPr>
+          </a:p>
+          <a:p>
+            <a:pPr lvl="0">
+              <a:buFont typeface="Courier New" pitchFamily="49"/>
+              <a:buChar char="_"/>
+            </a:pPr>
+            <a:endParaRPr lang="nl-NL">
+              <a:solidFill>
+                <a:srgbClr val="00FF00"/>
+              </a:solidFill>
+              <a:latin typeface="Courier New" pitchFamily="49"/>
+              <a:cs typeface="Courier New" pitchFamily="49"/>
+            </a:endParaRPr>
+          </a:p>
+        </p:txBody>
+      </p:sp>
+    </p:spTree>
+    <p:extLst>
+      <p:ext uri="{BB962C8B-B14F-4D97-AF65-F5344CB8AC3E}">
+        <p14:creationId xmlns:p14="http://schemas.microsoft.com/office/powerpoint/2010/main" val="127105607"/>
+      </p:ext>
+    </p:extLst>
+  </p:cSld>
+  <p:clrMapOvr>
+    <a:masterClrMapping/>
+  </p:clrMapOvr>
+</p:sld>
+</file>
+
+<file path=ppt/slides/slide49.xml><?xml version="1.0" encoding="utf-8"?>
 <p:sld xmlns:a="http://schemas.openxmlformats.org/drawingml/2006/main" xmlns:r="http://schemas.openxmlformats.org/officeDocument/2006/relationships" xmlns:p="http://schemas.openxmlformats.org/presentationml/2006/main">
   <p:cSld name="Slide34">
     <p:bg>
@@ -31806,41 +32278,6 @@
       </p:grpSpPr>
       <p:sp>
         <p:nvSpPr>
-          <p:cNvPr id="2" name="Title 1">
-            <a:extLst>
-              <a:ext uri="{FF2B5EF4-FFF2-40B4-BE49-F238E27FC236}">
-                <a16:creationId xmlns:a16="http://schemas.microsoft.com/office/drawing/2014/main" id="{72BB3EA3-35B6-4921-A243-D1347459E367}"/>
-              </a:ext>
-            </a:extLst>
-          </p:cNvPr>
-          <p:cNvSpPr txBox="1">
-            <a:spLocks noGrp="1"/>
-          </p:cNvSpPr>
-          <p:nvPr>
-            <p:ph type="title"/>
-          </p:nvPr>
-        </p:nvSpPr>
-        <p:spPr/>
-        <p:txBody>
-          <a:bodyPr/>
-          <a:lstStyle/>
-          <a:p>
-            <a:pPr lvl="0"/>
-            <a:r>
-              <a:rPr lang="nl-NL">
-                <a:solidFill>
-                  <a:srgbClr val="00FF00"/>
-                </a:solidFill>
-                <a:latin typeface="Courier New" pitchFamily="49"/>
-                <a:cs typeface="Courier New" pitchFamily="49"/>
-              </a:rPr>
-              <a:t>Questions</a:t>
-            </a:r>
-          </a:p>
-        </p:txBody>
-      </p:sp>
-      <p:sp>
-        <p:nvSpPr>
           <p:cNvPr id="3" name="Content Placeholder 2">
             <a:extLst>
               <a:ext uri="{FF2B5EF4-FFF2-40B4-BE49-F238E27FC236}">
@@ -31855,16 +32292,23 @@
             <p:ph idx="1"/>
           </p:nvPr>
         </p:nvSpPr>
-        <p:spPr/>
-        <p:txBody>
-          <a:bodyPr/>
+        <p:spPr>
+          <a:xfrm>
+            <a:off x="838200" y="904875"/>
+            <a:ext cx="10515600" cy="6572250"/>
+          </a:xfrm>
+        </p:spPr>
+        <p:txBody>
+          <a:bodyPr anchor="ctr">
+            <a:normAutofit fontScale="85000" lnSpcReduction="20000"/>
+          </a:bodyPr>
           <a:lstStyle/>
           <a:p>
             <a:pPr marL="0" lvl="0" indent="0" algn="ctr">
               <a:buNone/>
             </a:pPr>
             <a:r>
-              <a:rPr lang="nl-NL" sz="28800">
+              <a:rPr lang="nl-NL" sz="62300" b="1">
                 <a:solidFill>
                   <a:srgbClr val="00FF00"/>
                 </a:solidFill>
@@ -31873,388 +32317,7 @@
               </a:rPr>
               <a:t>?</a:t>
             </a:r>
-            <a:endParaRPr lang="nl-NL">
-              <a:solidFill>
-                <a:srgbClr val="00FF00"/>
-              </a:solidFill>
-              <a:latin typeface="Courier New" pitchFamily="49"/>
-              <a:cs typeface="Courier New" pitchFamily="49"/>
-            </a:endParaRPr>
-          </a:p>
-          <a:p>
-            <a:pPr lvl="0">
-              <a:buFont typeface="Courier New" pitchFamily="49"/>
-              <a:buChar char="_"/>
-            </a:pPr>
-            <a:endParaRPr lang="nl-NL">
-              <a:solidFill>
-                <a:srgbClr val="00FF00"/>
-              </a:solidFill>
-              <a:latin typeface="Courier New" pitchFamily="49"/>
-              <a:cs typeface="Courier New" pitchFamily="49"/>
-            </a:endParaRPr>
-          </a:p>
-          <a:p>
-            <a:pPr lvl="0">
-              <a:buFont typeface="Courier New" pitchFamily="49"/>
-              <a:buChar char="_"/>
-            </a:pPr>
-            <a:endParaRPr lang="nl-NL">
-              <a:solidFill>
-                <a:srgbClr val="00FF00"/>
-              </a:solidFill>
-              <a:latin typeface="Courier New" pitchFamily="49"/>
-              <a:cs typeface="Courier New" pitchFamily="49"/>
-            </a:endParaRPr>
-          </a:p>
-          <a:p>
-            <a:pPr lvl="0">
-              <a:buFont typeface="Courier New" pitchFamily="49"/>
-              <a:buChar char="_"/>
-            </a:pPr>
-            <a:endParaRPr lang="nl-NL">
-              <a:solidFill>
-                <a:srgbClr val="00FF00"/>
-              </a:solidFill>
-              <a:latin typeface="Courier New" pitchFamily="49"/>
-              <a:cs typeface="Courier New" pitchFamily="49"/>
-            </a:endParaRPr>
-          </a:p>
-          <a:p>
-            <a:pPr lvl="0">
-              <a:buFont typeface="Courier New" pitchFamily="49"/>
-              <a:buChar char="_"/>
-            </a:pPr>
-            <a:endParaRPr lang="nl-NL">
-              <a:solidFill>
-                <a:srgbClr val="00FF00"/>
-              </a:solidFill>
-              <a:latin typeface="Courier New" pitchFamily="49"/>
-              <a:cs typeface="Courier New" pitchFamily="49"/>
-            </a:endParaRPr>
-          </a:p>
-        </p:txBody>
-      </p:sp>
-    </p:spTree>
-  </p:cSld>
-  <p:clrMapOvr>
-    <a:masterClrMapping/>
-  </p:clrMapOvr>
-</p:sld>
-</file>
-
-<file path=ppt/slides/slide49.xml><?xml version="1.0" encoding="utf-8"?>
-<p:sld xmlns:a="http://schemas.openxmlformats.org/drawingml/2006/main" xmlns:r="http://schemas.openxmlformats.org/officeDocument/2006/relationships" xmlns:p="http://schemas.openxmlformats.org/presentationml/2006/main">
-  <p:cSld name="Slide35">
-    <p:bg>
-      <p:bgPr>
-        <a:solidFill>
-          <a:srgbClr val="000000"/>
-        </a:solidFill>
-        <a:effectLst/>
-      </p:bgPr>
-    </p:bg>
-    <p:spTree>
-      <p:nvGrpSpPr>
-        <p:cNvPr id="1" name=""/>
-        <p:cNvGrpSpPr/>
-        <p:nvPr/>
-      </p:nvGrpSpPr>
-      <p:grpSpPr>
-        <a:xfrm>
-          <a:off x="0" y="0"/>
-          <a:ext cx="0" cy="0"/>
-          <a:chOff x="0" y="0"/>
-          <a:chExt cx="0" cy="0"/>
-        </a:xfrm>
-      </p:grpSpPr>
-      <p:sp>
-        <p:nvSpPr>
-          <p:cNvPr id="2" name="Title 1">
-            <a:extLst>
-              <a:ext uri="{FF2B5EF4-FFF2-40B4-BE49-F238E27FC236}">
-                <a16:creationId xmlns:a16="http://schemas.microsoft.com/office/drawing/2014/main" id="{F94DBAFA-C47D-4CCB-A515-A7187FB0D23B}"/>
-              </a:ext>
-            </a:extLst>
-          </p:cNvPr>
-          <p:cNvSpPr txBox="1">
-            <a:spLocks noGrp="1"/>
-          </p:cNvSpPr>
-          <p:nvPr>
-            <p:ph type="title"/>
-          </p:nvPr>
-        </p:nvSpPr>
-        <p:spPr/>
-        <p:txBody>
-          <a:bodyPr/>
-          <a:lstStyle/>
-          <a:p>
-            <a:pPr lvl="0"/>
-            <a:r>
-              <a:rPr lang="nl-NL">
-                <a:solidFill>
-                  <a:srgbClr val="00FF00"/>
-                </a:solidFill>
-                <a:latin typeface="Courier New" pitchFamily="49"/>
-                <a:cs typeface="Courier New" pitchFamily="49"/>
-              </a:rPr>
-              <a:t>Contact</a:t>
-            </a:r>
-          </a:p>
-        </p:txBody>
-      </p:sp>
-      <p:sp>
-        <p:nvSpPr>
-          <p:cNvPr id="3" name="Content Placeholder 2">
-            <a:extLst>
-              <a:ext uri="{FF2B5EF4-FFF2-40B4-BE49-F238E27FC236}">
-                <a16:creationId xmlns:a16="http://schemas.microsoft.com/office/drawing/2014/main" id="{8234DCF3-A2F3-4EBF-8EF5-1B64E732C78F}"/>
-              </a:ext>
-            </a:extLst>
-          </p:cNvPr>
-          <p:cNvSpPr txBox="1">
-            <a:spLocks noGrp="1"/>
-          </p:cNvSpPr>
-          <p:nvPr>
-            <p:ph idx="1"/>
-          </p:nvPr>
-        </p:nvSpPr>
-        <p:spPr>
-          <a:xfrm>
-            <a:off x="838203" y="1825627"/>
-            <a:ext cx="11150595" cy="4351336"/>
-          </a:xfrm>
-        </p:spPr>
-        <p:txBody>
-          <a:bodyPr/>
-          <a:lstStyle/>
-          <a:p>
-            <a:pPr lvl="0">
-              <a:buFont typeface="Courier New" pitchFamily="49"/>
-              <a:buChar char="_"/>
-            </a:pPr>
-            <a:r>
-              <a:rPr lang="nl-NL">
-                <a:solidFill>
-                  <a:srgbClr val="00FF00"/>
-                </a:solidFill>
-                <a:latin typeface="Courier New" pitchFamily="49"/>
-                <a:cs typeface="Courier New" pitchFamily="49"/>
-              </a:rPr>
-              <a:t>Email:    </a:t>
-            </a:r>
-            <a:r>
-              <a:rPr lang="nl-NL">
-                <a:solidFill>
-                  <a:srgbClr val="0070C0"/>
-                </a:solidFill>
-                <a:latin typeface="Courier New" pitchFamily="49"/>
-                <a:cs typeface="Courier New" pitchFamily="49"/>
-              </a:rPr>
-              <a:t>bas@ontestautomation.com</a:t>
-            </a:r>
-          </a:p>
-          <a:p>
-            <a:pPr lvl="0">
-              <a:buFont typeface="Courier New" pitchFamily="49"/>
-              <a:buChar char="_"/>
-            </a:pPr>
-            <a:endParaRPr lang="nl-NL">
-              <a:solidFill>
-                <a:srgbClr val="00FF00"/>
-              </a:solidFill>
-              <a:latin typeface="Courier New" pitchFamily="49"/>
-              <a:cs typeface="Courier New" pitchFamily="49"/>
-            </a:endParaRPr>
-          </a:p>
-          <a:p>
-            <a:pPr lvl="0">
-              <a:buFont typeface="Courier New" pitchFamily="49"/>
-              <a:buChar char="_"/>
-            </a:pPr>
-            <a:r>
-              <a:rPr lang="nl-NL">
-                <a:solidFill>
-                  <a:srgbClr val="00FF00"/>
-                </a:solidFill>
-                <a:latin typeface="Courier New" pitchFamily="49"/>
-                <a:cs typeface="Courier New" pitchFamily="49"/>
-              </a:rPr>
-              <a:t>Blog:     </a:t>
-            </a:r>
-            <a:r>
-              <a:rPr lang="nl-NL">
-                <a:solidFill>
-                  <a:srgbClr val="0070C0"/>
-                </a:solidFill>
-                <a:latin typeface="Courier New" pitchFamily="49"/>
-                <a:cs typeface="Courier New" pitchFamily="49"/>
-              </a:rPr>
-              <a:t>https://www.ontestautomation.com</a:t>
-            </a:r>
-          </a:p>
-          <a:p>
-            <a:pPr lvl="0">
-              <a:buFont typeface="Courier New" pitchFamily="49"/>
-              <a:buChar char="_"/>
-            </a:pPr>
-            <a:endParaRPr lang="nl-NL">
-              <a:solidFill>
-                <a:srgbClr val="0070C0"/>
-              </a:solidFill>
-              <a:latin typeface="Courier New" pitchFamily="49"/>
-              <a:cs typeface="Courier New" pitchFamily="49"/>
-            </a:endParaRPr>
-          </a:p>
-          <a:p>
-            <a:pPr lvl="0">
-              <a:buFont typeface="Courier New" pitchFamily="49"/>
-              <a:buChar char="_"/>
-            </a:pPr>
-            <a:r>
-              <a:rPr lang="nl-NL">
-                <a:solidFill>
-                  <a:srgbClr val="00FF00"/>
-                </a:solidFill>
-                <a:latin typeface="Courier New" pitchFamily="49"/>
-                <a:cs typeface="Courier New" pitchFamily="49"/>
-              </a:rPr>
-              <a:t>LinkedIn: </a:t>
-            </a:r>
-            <a:r>
-              <a:rPr lang="nl-NL">
-                <a:solidFill>
-                  <a:srgbClr val="0070C0"/>
-                </a:solidFill>
-                <a:latin typeface="Courier New" pitchFamily="49"/>
-                <a:cs typeface="Courier New" pitchFamily="49"/>
-              </a:rPr>
-              <a:t>https://www.linkedin.com/in/basdijkstra</a:t>
-            </a:r>
-          </a:p>
-          <a:p>
-            <a:pPr lvl="0">
-              <a:buFont typeface="Courier New" pitchFamily="49"/>
-              <a:buChar char="_"/>
-            </a:pPr>
-            <a:endParaRPr lang="nl-NL">
-              <a:solidFill>
-                <a:srgbClr val="00FF00"/>
-              </a:solidFill>
-              <a:latin typeface="Courier New" pitchFamily="49"/>
-              <a:cs typeface="Courier New" pitchFamily="49"/>
-            </a:endParaRPr>
-          </a:p>
-          <a:p>
-            <a:pPr lvl="0">
-              <a:buFont typeface="Courier New" pitchFamily="49"/>
-              <a:buChar char="_"/>
-            </a:pPr>
-            <a:r>
-              <a:rPr lang="nl-NL">
-                <a:solidFill>
-                  <a:srgbClr val="00FF00"/>
-                </a:solidFill>
-                <a:latin typeface="Courier New" pitchFamily="49"/>
-                <a:cs typeface="Courier New" pitchFamily="49"/>
-              </a:rPr>
-              <a:t>Twitter:  </a:t>
-            </a:r>
-            <a:r>
-              <a:rPr lang="nl-NL">
-                <a:solidFill>
-                  <a:srgbClr val="0070C0"/>
-                </a:solidFill>
-                <a:latin typeface="Courier New" pitchFamily="49"/>
-                <a:cs typeface="Courier New" pitchFamily="49"/>
-              </a:rPr>
-              <a:t>@_basdijkstra</a:t>
-            </a:r>
-          </a:p>
-          <a:p>
-            <a:pPr lvl="0">
-              <a:buFont typeface="Courier New" pitchFamily="49"/>
-              <a:buChar char="_"/>
-            </a:pPr>
-            <a:endParaRPr lang="nl-NL">
-              <a:solidFill>
-                <a:srgbClr val="00FF00"/>
-              </a:solidFill>
-              <a:latin typeface="Courier New" pitchFamily="49"/>
-              <a:cs typeface="Courier New" pitchFamily="49"/>
-            </a:endParaRPr>
-          </a:p>
-          <a:p>
-            <a:pPr lvl="0">
-              <a:buFont typeface="Courier New" pitchFamily="49"/>
-              <a:buChar char="_"/>
-            </a:pPr>
-            <a:endParaRPr lang="nl-NL">
-              <a:solidFill>
-                <a:srgbClr val="00FF00"/>
-              </a:solidFill>
-              <a:latin typeface="Courier New" pitchFamily="49"/>
-              <a:cs typeface="Courier New" pitchFamily="49"/>
-            </a:endParaRPr>
-          </a:p>
-          <a:p>
-            <a:pPr lvl="0">
-              <a:buFont typeface="Courier New" pitchFamily="49"/>
-              <a:buChar char="_"/>
-            </a:pPr>
-            <a:endParaRPr lang="nl-NL">
-              <a:solidFill>
-                <a:srgbClr val="00FF00"/>
-              </a:solidFill>
-              <a:latin typeface="Courier New" pitchFamily="49"/>
-              <a:cs typeface="Courier New" pitchFamily="49"/>
-            </a:endParaRPr>
-          </a:p>
-          <a:p>
-            <a:pPr lvl="0">
-              <a:buFont typeface="Courier New" pitchFamily="49"/>
-              <a:buChar char="_"/>
-            </a:pPr>
-            <a:endParaRPr lang="nl-NL">
-              <a:solidFill>
-                <a:srgbClr val="00FF00"/>
-              </a:solidFill>
-              <a:latin typeface="Courier New" pitchFamily="49"/>
-              <a:cs typeface="Courier New" pitchFamily="49"/>
-            </a:endParaRPr>
-          </a:p>
-          <a:p>
-            <a:pPr lvl="0">
-              <a:buFont typeface="Courier New" pitchFamily="49"/>
-              <a:buChar char="_"/>
-            </a:pPr>
-            <a:endParaRPr lang="nl-NL">
-              <a:solidFill>
-                <a:srgbClr val="00FF00"/>
-              </a:solidFill>
-              <a:latin typeface="Courier New" pitchFamily="49"/>
-              <a:cs typeface="Courier New" pitchFamily="49"/>
-            </a:endParaRPr>
-          </a:p>
-          <a:p>
-            <a:pPr lvl="0">
-              <a:buFont typeface="Courier New" pitchFamily="49"/>
-              <a:buChar char="_"/>
-            </a:pPr>
-            <a:endParaRPr lang="nl-NL">
-              <a:solidFill>
-                <a:srgbClr val="00FF00"/>
-              </a:solidFill>
-              <a:latin typeface="Courier New" pitchFamily="49"/>
-              <a:cs typeface="Courier New" pitchFamily="49"/>
-            </a:endParaRPr>
-          </a:p>
-          <a:p>
-            <a:pPr lvl="0">
-              <a:buFont typeface="Courier New" pitchFamily="49"/>
-              <a:buChar char="_"/>
-            </a:pPr>
-            <a:endParaRPr lang="nl-NL">
+            <a:endParaRPr lang="nl-NL" sz="2400" b="1">
               <a:solidFill>
                 <a:srgbClr val="00FF00"/>
               </a:solidFill>
@@ -32433,6 +32496,394 @@
           </a:ln>
         </p:spPr>
       </p:pic>
+    </p:spTree>
+  </p:cSld>
+  <p:clrMapOvr>
+    <a:masterClrMapping/>
+  </p:clrMapOvr>
+</p:sld>
+</file>
+
+<file path=ppt/slides/slide50.xml><?xml version="1.0" encoding="utf-8"?>
+<p:sld xmlns:a="http://schemas.openxmlformats.org/drawingml/2006/main" xmlns:r="http://schemas.openxmlformats.org/officeDocument/2006/relationships" xmlns:p="http://schemas.openxmlformats.org/presentationml/2006/main">
+  <p:cSld>
+    <p:bg>
+      <p:bgPr>
+        <a:solidFill>
+          <a:srgbClr val="000000"/>
+        </a:solidFill>
+        <a:effectLst/>
+      </p:bgPr>
+    </p:bg>
+    <p:spTree>
+      <p:nvGrpSpPr>
+        <p:cNvPr id="1" name=""/>
+        <p:cNvGrpSpPr/>
+        <p:nvPr/>
+      </p:nvGrpSpPr>
+      <p:grpSpPr>
+        <a:xfrm>
+          <a:off x="0" y="0"/>
+          <a:ext cx="0" cy="0"/>
+          <a:chOff x="0" y="0"/>
+          <a:chExt cx="0" cy="0"/>
+        </a:xfrm>
+      </p:grpSpPr>
+      <p:sp>
+        <p:nvSpPr>
+          <p:cNvPr id="3" name="Content Placeholder 2">
+            <a:extLst>
+              <a:ext uri="{FF2B5EF4-FFF2-40B4-BE49-F238E27FC236}">
+                <a16:creationId xmlns:a16="http://schemas.microsoft.com/office/drawing/2014/main" id="{55568036-DA7E-4D10-B37C-1B11EE7AE419}"/>
+              </a:ext>
+            </a:extLst>
+          </p:cNvPr>
+          <p:cNvSpPr txBox="1">
+            <a:spLocks noGrp="1"/>
+          </p:cNvSpPr>
+          <p:nvPr>
+            <p:ph idx="1"/>
+          </p:nvPr>
+        </p:nvSpPr>
+        <p:spPr>
+          <a:xfrm>
+            <a:off x="0" y="478631"/>
+            <a:ext cx="12192000" cy="5900738"/>
+          </a:xfrm>
+        </p:spPr>
+        <p:txBody>
+          <a:bodyPr anchor="ctr">
+            <a:normAutofit/>
+          </a:bodyPr>
+          <a:lstStyle/>
+          <a:p>
+            <a:pPr marL="0" lvl="0" indent="0" algn="ctr">
+              <a:buNone/>
+            </a:pPr>
+            <a:r>
+              <a:rPr lang="nl-NL" sz="4000">
+                <a:solidFill>
+                  <a:srgbClr val="00FF00"/>
+                </a:solidFill>
+                <a:latin typeface="Courier New" pitchFamily="49"/>
+                <a:cs typeface="Courier New" pitchFamily="49"/>
+              </a:rPr>
+              <a:t>https://testautomationu.applitools.com</a:t>
+            </a:r>
+          </a:p>
+          <a:p>
+            <a:pPr marL="0" lvl="0" indent="0" algn="ctr">
+              <a:buNone/>
+            </a:pPr>
+            <a:r>
+              <a:rPr lang="nl-NL" sz="4000">
+                <a:solidFill>
+                  <a:srgbClr val="00FF00"/>
+                </a:solidFill>
+                <a:latin typeface="Courier New" pitchFamily="49"/>
+                <a:cs typeface="Courier New" pitchFamily="49"/>
+              </a:rPr>
+              <a:t>/automating-your-api-tests-with-rest-assured/</a:t>
+            </a:r>
+            <a:endParaRPr lang="nl-NL" sz="300">
+              <a:solidFill>
+                <a:srgbClr val="00FF00"/>
+              </a:solidFill>
+              <a:latin typeface="Courier New" pitchFamily="49"/>
+              <a:cs typeface="Courier New" pitchFamily="49"/>
+            </a:endParaRPr>
+          </a:p>
+        </p:txBody>
+      </p:sp>
+    </p:spTree>
+    <p:extLst>
+      <p:ext uri="{BB962C8B-B14F-4D97-AF65-F5344CB8AC3E}">
+        <p14:creationId xmlns:p14="http://schemas.microsoft.com/office/powerpoint/2010/main" val="450933832"/>
+      </p:ext>
+    </p:extLst>
+  </p:cSld>
+  <p:clrMapOvr>
+    <a:masterClrMapping/>
+  </p:clrMapOvr>
+</p:sld>
+</file>
+
+<file path=ppt/slides/slide51.xml><?xml version="1.0" encoding="utf-8"?>
+<p:sld xmlns:a="http://schemas.openxmlformats.org/drawingml/2006/main" xmlns:r="http://schemas.openxmlformats.org/officeDocument/2006/relationships" xmlns:p="http://schemas.openxmlformats.org/presentationml/2006/main">
+  <p:cSld name="Slide35">
+    <p:bg>
+      <p:bgPr>
+        <a:solidFill>
+          <a:srgbClr val="000000"/>
+        </a:solidFill>
+        <a:effectLst/>
+      </p:bgPr>
+    </p:bg>
+    <p:spTree>
+      <p:nvGrpSpPr>
+        <p:cNvPr id="1" name=""/>
+        <p:cNvGrpSpPr/>
+        <p:nvPr/>
+      </p:nvGrpSpPr>
+      <p:grpSpPr>
+        <a:xfrm>
+          <a:off x="0" y="0"/>
+          <a:ext cx="0" cy="0"/>
+          <a:chOff x="0" y="0"/>
+          <a:chExt cx="0" cy="0"/>
+        </a:xfrm>
+      </p:grpSpPr>
+      <p:sp>
+        <p:nvSpPr>
+          <p:cNvPr id="2" name="Title 1">
+            <a:extLst>
+              <a:ext uri="{FF2B5EF4-FFF2-40B4-BE49-F238E27FC236}">
+                <a16:creationId xmlns:a16="http://schemas.microsoft.com/office/drawing/2014/main" id="{F94DBAFA-C47D-4CCB-A515-A7187FB0D23B}"/>
+              </a:ext>
+            </a:extLst>
+          </p:cNvPr>
+          <p:cNvSpPr txBox="1">
+            <a:spLocks noGrp="1"/>
+          </p:cNvSpPr>
+          <p:nvPr>
+            <p:ph type="title"/>
+          </p:nvPr>
+        </p:nvSpPr>
+        <p:spPr/>
+        <p:txBody>
+          <a:bodyPr/>
+          <a:lstStyle/>
+          <a:p>
+            <a:pPr lvl="0"/>
+            <a:r>
+              <a:rPr lang="nl-NL">
+                <a:solidFill>
+                  <a:srgbClr val="00FF00"/>
+                </a:solidFill>
+                <a:latin typeface="Courier New" pitchFamily="49"/>
+                <a:cs typeface="Courier New" pitchFamily="49"/>
+              </a:rPr>
+              <a:t>Contact</a:t>
+            </a:r>
+          </a:p>
+        </p:txBody>
+      </p:sp>
+      <p:sp>
+        <p:nvSpPr>
+          <p:cNvPr id="3" name="Content Placeholder 2">
+            <a:extLst>
+              <a:ext uri="{FF2B5EF4-FFF2-40B4-BE49-F238E27FC236}">
+                <a16:creationId xmlns:a16="http://schemas.microsoft.com/office/drawing/2014/main" id="{8234DCF3-A2F3-4EBF-8EF5-1B64E732C78F}"/>
+              </a:ext>
+            </a:extLst>
+          </p:cNvPr>
+          <p:cNvSpPr txBox="1">
+            <a:spLocks noGrp="1"/>
+          </p:cNvSpPr>
+          <p:nvPr>
+            <p:ph idx="1"/>
+          </p:nvPr>
+        </p:nvSpPr>
+        <p:spPr>
+          <a:xfrm>
+            <a:off x="838203" y="1825627"/>
+            <a:ext cx="11150595" cy="4351336"/>
+          </a:xfrm>
+        </p:spPr>
+        <p:txBody>
+          <a:bodyPr/>
+          <a:lstStyle/>
+          <a:p>
+            <a:pPr lvl="0">
+              <a:buFont typeface="Courier New" pitchFamily="49"/>
+              <a:buChar char="_"/>
+            </a:pPr>
+            <a:r>
+              <a:rPr lang="nl-NL">
+                <a:solidFill>
+                  <a:srgbClr val="00FF00"/>
+                </a:solidFill>
+                <a:latin typeface="Courier New" pitchFamily="49"/>
+                <a:cs typeface="Courier New" pitchFamily="49"/>
+              </a:rPr>
+              <a:t>Email:    </a:t>
+            </a:r>
+            <a:r>
+              <a:rPr lang="nl-NL">
+                <a:solidFill>
+                  <a:srgbClr val="0070C0"/>
+                </a:solidFill>
+                <a:latin typeface="Courier New" pitchFamily="49"/>
+                <a:cs typeface="Courier New" pitchFamily="49"/>
+              </a:rPr>
+              <a:t>bas@ontestautomation.com</a:t>
+            </a:r>
+          </a:p>
+          <a:p>
+            <a:pPr lvl="0">
+              <a:buFont typeface="Courier New" pitchFamily="49"/>
+              <a:buChar char="_"/>
+            </a:pPr>
+            <a:endParaRPr lang="nl-NL">
+              <a:solidFill>
+                <a:srgbClr val="00FF00"/>
+              </a:solidFill>
+              <a:latin typeface="Courier New" pitchFamily="49"/>
+              <a:cs typeface="Courier New" pitchFamily="49"/>
+            </a:endParaRPr>
+          </a:p>
+          <a:p>
+            <a:pPr lvl="0">
+              <a:buFont typeface="Courier New" pitchFamily="49"/>
+              <a:buChar char="_"/>
+            </a:pPr>
+            <a:r>
+              <a:rPr lang="nl-NL">
+                <a:solidFill>
+                  <a:srgbClr val="00FF00"/>
+                </a:solidFill>
+                <a:latin typeface="Courier New" pitchFamily="49"/>
+                <a:cs typeface="Courier New" pitchFamily="49"/>
+              </a:rPr>
+              <a:t>Blog:     </a:t>
+            </a:r>
+            <a:r>
+              <a:rPr lang="nl-NL">
+                <a:solidFill>
+                  <a:srgbClr val="0070C0"/>
+                </a:solidFill>
+                <a:latin typeface="Courier New" pitchFamily="49"/>
+                <a:cs typeface="Courier New" pitchFamily="49"/>
+              </a:rPr>
+              <a:t>https://www.ontestautomation.com</a:t>
+            </a:r>
+          </a:p>
+          <a:p>
+            <a:pPr lvl="0">
+              <a:buFont typeface="Courier New" pitchFamily="49"/>
+              <a:buChar char="_"/>
+            </a:pPr>
+            <a:endParaRPr lang="nl-NL">
+              <a:solidFill>
+                <a:srgbClr val="0070C0"/>
+              </a:solidFill>
+              <a:latin typeface="Courier New" pitchFamily="49"/>
+              <a:cs typeface="Courier New" pitchFamily="49"/>
+            </a:endParaRPr>
+          </a:p>
+          <a:p>
+            <a:pPr lvl="0">
+              <a:buFont typeface="Courier New" pitchFamily="49"/>
+              <a:buChar char="_"/>
+            </a:pPr>
+            <a:r>
+              <a:rPr lang="nl-NL">
+                <a:solidFill>
+                  <a:srgbClr val="00FF00"/>
+                </a:solidFill>
+                <a:latin typeface="Courier New" pitchFamily="49"/>
+                <a:cs typeface="Courier New" pitchFamily="49"/>
+              </a:rPr>
+              <a:t>LinkedIn: </a:t>
+            </a:r>
+            <a:r>
+              <a:rPr lang="nl-NL">
+                <a:solidFill>
+                  <a:srgbClr val="0070C0"/>
+                </a:solidFill>
+                <a:latin typeface="Courier New" pitchFamily="49"/>
+                <a:cs typeface="Courier New" pitchFamily="49"/>
+              </a:rPr>
+              <a:t>https://www.linkedin.com/in/basdijkstra</a:t>
+            </a:r>
+            <a:endParaRPr lang="nl-NL">
+              <a:solidFill>
+                <a:srgbClr val="00FF00"/>
+              </a:solidFill>
+              <a:latin typeface="Courier New" pitchFamily="49"/>
+              <a:cs typeface="Courier New" pitchFamily="49"/>
+            </a:endParaRPr>
+          </a:p>
+          <a:p>
+            <a:pPr lvl="0">
+              <a:buFont typeface="Courier New" pitchFamily="49"/>
+              <a:buChar char="_"/>
+            </a:pPr>
+            <a:endParaRPr lang="nl-NL">
+              <a:solidFill>
+                <a:srgbClr val="00FF00"/>
+              </a:solidFill>
+              <a:latin typeface="Courier New" pitchFamily="49"/>
+              <a:cs typeface="Courier New" pitchFamily="49"/>
+            </a:endParaRPr>
+          </a:p>
+          <a:p>
+            <a:pPr lvl="0">
+              <a:buFont typeface="Courier New" pitchFamily="49"/>
+              <a:buChar char="_"/>
+            </a:pPr>
+            <a:endParaRPr lang="nl-NL">
+              <a:solidFill>
+                <a:srgbClr val="00FF00"/>
+              </a:solidFill>
+              <a:latin typeface="Courier New" pitchFamily="49"/>
+              <a:cs typeface="Courier New" pitchFamily="49"/>
+            </a:endParaRPr>
+          </a:p>
+          <a:p>
+            <a:pPr lvl="0">
+              <a:buFont typeface="Courier New" pitchFamily="49"/>
+              <a:buChar char="_"/>
+            </a:pPr>
+            <a:endParaRPr lang="nl-NL">
+              <a:solidFill>
+                <a:srgbClr val="00FF00"/>
+              </a:solidFill>
+              <a:latin typeface="Courier New" pitchFamily="49"/>
+              <a:cs typeface="Courier New" pitchFamily="49"/>
+            </a:endParaRPr>
+          </a:p>
+          <a:p>
+            <a:pPr lvl="0">
+              <a:buFont typeface="Courier New" pitchFamily="49"/>
+              <a:buChar char="_"/>
+            </a:pPr>
+            <a:endParaRPr lang="nl-NL">
+              <a:solidFill>
+                <a:srgbClr val="00FF00"/>
+              </a:solidFill>
+              <a:latin typeface="Courier New" pitchFamily="49"/>
+              <a:cs typeface="Courier New" pitchFamily="49"/>
+            </a:endParaRPr>
+          </a:p>
+          <a:p>
+            <a:pPr lvl="0">
+              <a:buFont typeface="Courier New" pitchFamily="49"/>
+              <a:buChar char="_"/>
+            </a:pPr>
+            <a:endParaRPr lang="nl-NL">
+              <a:solidFill>
+                <a:srgbClr val="00FF00"/>
+              </a:solidFill>
+              <a:latin typeface="Courier New" pitchFamily="49"/>
+              <a:cs typeface="Courier New" pitchFamily="49"/>
+            </a:endParaRPr>
+          </a:p>
+          <a:p>
+            <a:pPr lvl="0">
+              <a:buFont typeface="Courier New" pitchFamily="49"/>
+              <a:buChar char="_"/>
+            </a:pPr>
+            <a:endParaRPr lang="nl-NL">
+              <a:solidFill>
+                <a:srgbClr val="00FF00"/>
+              </a:solidFill>
+              <a:latin typeface="Courier New" pitchFamily="49"/>
+              <a:cs typeface="Courier New" pitchFamily="49"/>
+            </a:endParaRPr>
+          </a:p>
+        </p:txBody>
+      </p:sp>
     </p:spTree>
   </p:cSld>
   <p:clrMapOvr>

</xml_diff>

<commit_message>
Updated capstone assignment with deserialization, added Lombok as a dependency for easier POJO management
</commit_message>
<xml_diff>
--- a/RestAssuredWorkshop.pptx
+++ b/RestAssuredWorkshop.pptx
@@ -32137,6 +32137,22 @@
                 <a:cs typeface="Courier New" pitchFamily="49"/>
               </a:rPr>
               <a:t>Extracting values from responses</a:t>
+            </a:r>
+          </a:p>
+          <a:p>
+            <a:pPr lvl="1">
+              <a:buFont typeface="Courier New" pitchFamily="49"/>
+              <a:buChar char="_"/>
+            </a:pPr>
+            <a:r>
+              <a:rPr lang="nl-NL">
+                <a:solidFill>
+                  <a:srgbClr val="00FF00"/>
+                </a:solidFill>
+                <a:latin typeface="Courier New" pitchFamily="49"/>
+                <a:cs typeface="Courier New" pitchFamily="49"/>
+              </a:rPr>
+              <a:t>Deserialization</a:t>
             </a:r>
           </a:p>
           <a:p>

</xml_diff>